<commit_message>
Edited loss func pic
</commit_message>
<xml_diff>
--- a/team3.pptx
+++ b/team3.pptx
@@ -267,7 +267,7 @@
           <a:p>
             <a:fld id="{09404497-135A-4F3E-B825-69756BB0AA32}" type="datetimeFigureOut">
               <a:rPr lang="en-US" smtClean="0"/>
-              <a:t>7/31/2025</a:t>
+              <a:t>8/1/2025</a:t>
             </a:fld>
             <a:endParaRPr lang="en-US"/>
           </a:p>
@@ -465,7 +465,7 @@
           <a:p>
             <a:fld id="{09404497-135A-4F3E-B825-69756BB0AA32}" type="datetimeFigureOut">
               <a:rPr lang="en-US" smtClean="0"/>
-              <a:t>7/31/2025</a:t>
+              <a:t>8/1/2025</a:t>
             </a:fld>
             <a:endParaRPr lang="en-US"/>
           </a:p>
@@ -673,7 +673,7 @@
           <a:p>
             <a:fld id="{09404497-135A-4F3E-B825-69756BB0AA32}" type="datetimeFigureOut">
               <a:rPr lang="en-US" smtClean="0"/>
-              <a:t>7/31/2025</a:t>
+              <a:t>8/1/2025</a:t>
             </a:fld>
             <a:endParaRPr lang="en-US"/>
           </a:p>
@@ -871,7 +871,7 @@
           <a:p>
             <a:fld id="{09404497-135A-4F3E-B825-69756BB0AA32}" type="datetimeFigureOut">
               <a:rPr lang="en-US" smtClean="0"/>
-              <a:t>7/31/2025</a:t>
+              <a:t>8/1/2025</a:t>
             </a:fld>
             <a:endParaRPr lang="en-US"/>
           </a:p>
@@ -1146,7 +1146,7 @@
           <a:p>
             <a:fld id="{09404497-135A-4F3E-B825-69756BB0AA32}" type="datetimeFigureOut">
               <a:rPr lang="en-US" smtClean="0"/>
-              <a:t>7/31/2025</a:t>
+              <a:t>8/1/2025</a:t>
             </a:fld>
             <a:endParaRPr lang="en-US"/>
           </a:p>
@@ -1411,7 +1411,7 @@
           <a:p>
             <a:fld id="{09404497-135A-4F3E-B825-69756BB0AA32}" type="datetimeFigureOut">
               <a:rPr lang="en-US" smtClean="0"/>
-              <a:t>7/31/2025</a:t>
+              <a:t>8/1/2025</a:t>
             </a:fld>
             <a:endParaRPr lang="en-US"/>
           </a:p>
@@ -1823,7 +1823,7 @@
           <a:p>
             <a:fld id="{09404497-135A-4F3E-B825-69756BB0AA32}" type="datetimeFigureOut">
               <a:rPr lang="en-US" smtClean="0"/>
-              <a:t>7/31/2025</a:t>
+              <a:t>8/1/2025</a:t>
             </a:fld>
             <a:endParaRPr lang="en-US"/>
           </a:p>
@@ -1964,7 +1964,7 @@
           <a:p>
             <a:fld id="{09404497-135A-4F3E-B825-69756BB0AA32}" type="datetimeFigureOut">
               <a:rPr lang="en-US" smtClean="0"/>
-              <a:t>7/31/2025</a:t>
+              <a:t>8/1/2025</a:t>
             </a:fld>
             <a:endParaRPr lang="en-US"/>
           </a:p>
@@ -2077,7 +2077,7 @@
           <a:p>
             <a:fld id="{09404497-135A-4F3E-B825-69756BB0AA32}" type="datetimeFigureOut">
               <a:rPr lang="en-US" smtClean="0"/>
-              <a:t>7/31/2025</a:t>
+              <a:t>8/1/2025</a:t>
             </a:fld>
             <a:endParaRPr lang="en-US"/>
           </a:p>
@@ -2388,7 +2388,7 @@
           <a:p>
             <a:fld id="{09404497-135A-4F3E-B825-69756BB0AA32}" type="datetimeFigureOut">
               <a:rPr lang="en-US" smtClean="0"/>
-              <a:t>7/31/2025</a:t>
+              <a:t>8/1/2025</a:t>
             </a:fld>
             <a:endParaRPr lang="en-US"/>
           </a:p>
@@ -2676,7 +2676,7 @@
           <a:p>
             <a:fld id="{09404497-135A-4F3E-B825-69756BB0AA32}" type="datetimeFigureOut">
               <a:rPr lang="en-US" smtClean="0"/>
-              <a:t>7/31/2025</a:t>
+              <a:t>8/1/2025</a:t>
             </a:fld>
             <a:endParaRPr lang="en-US"/>
           </a:p>
@@ -2917,7 +2917,7 @@
           <a:p>
             <a:fld id="{09404497-135A-4F3E-B825-69756BB0AA32}" type="datetimeFigureOut">
               <a:rPr lang="en-US" smtClean="0"/>
-              <a:t>7/31/2025</a:t>
+              <a:t>8/1/2025</a:t>
             </a:fld>
             <a:endParaRPr lang="en-US"/>
           </a:p>
@@ -8510,7 +8510,7 @@
       </p:pic>
       <p:pic>
         <p:nvPicPr>
-          <p:cNvPr id="20" name="Picture 19" descr="A graph with blue lines&#10;&#10;AI-generated content may be incorrect.">
+          <p:cNvPr id="20" name="Picture 19">
             <a:extLst>
               <a:ext uri="{FF2B5EF4-FFF2-40B4-BE49-F238E27FC236}">
                 <a16:creationId xmlns:a16="http://schemas.microsoft.com/office/drawing/2014/main" id="{B76E1354-610F-4326-1A30-D1EBC1F18374}"/>
@@ -8530,14 +8530,13 @@
               </a:ext>
             </a:extLst>
           </a:blip>
-          <a:stretch>
-            <a:fillRect/>
-          </a:stretch>
+          <a:srcRect/>
+          <a:stretch/>
         </p:blipFill>
         <p:spPr>
           <a:xfrm>
-            <a:off x="438168" y="1507868"/>
-            <a:ext cx="4981575" cy="3743325"/>
+            <a:off x="438168" y="1536066"/>
+            <a:ext cx="4981575" cy="3686928"/>
           </a:xfrm>
           <a:prstGeom prst="rect">
             <a:avLst/>

</xml_diff>